<commit_message>
Updated slide gioi thieu chung
</commit_message>
<xml_diff>
--- a/0-GIOI-THIEU-CHUNG.pptx
+++ b/0-GIOI-THIEU-CHUNG.pptx
@@ -216,7 +216,7 @@
           </a:lstStyle>
           <a:p>
             <a:fld id="{E8611BE7-26AC-C944-82B9-0A7490D91C07}" type="datetimeFigureOut">
-              <a:t>5/3/20</a:t>
+              <a:t>5/4/20</a:t>
             </a:fld>
             <a:endParaRPr lang="vi-VN"/>
           </a:p>
@@ -2093,7 +2093,7 @@
                 </a:solidFill>
                 <a:latin typeface="Lato" panose="020F0502020204030203" pitchFamily="34" charset="0"/>
               </a:rPr>
-              <a:t>JavaScript &amp; JS Library AJAX: 16 giờ – 4 buổi</a:t>
+              <a:t>JavaScript &amp; JS Library jQuery: 16 giờ – 4 buổi</a:t>
             </a:r>
           </a:p>
           <a:p>
@@ -4631,7 +4631,7 @@
               <a:buChar char="q"/>
             </a:pPr>
             <a:r>
-              <a:rPr lang="en-US" sz="3600" dirty="0">
+              <a:rPr lang="en-US" sz="3600" strike="sngStrike" dirty="0">
                 <a:solidFill>
                   <a:schemeClr val="bg1"/>
                 </a:solidFill>
@@ -4640,7 +4640,7 @@
               </a:rPr>
               <a:t>Cài đặt XAMPP PHP 7</a:t>
             </a:r>
-            <a:endParaRPr lang="vi-VN" sz="3600" dirty="0">
+            <a:endParaRPr lang="vi-VN" sz="3600" strike="sngStrike" dirty="0">
               <a:solidFill>
                 <a:schemeClr val="bg1"/>
               </a:solidFill>

</xml_diff>